<commit_message>
Finale Version der Nanobio-Vorträge
</commit_message>
<xml_diff>
--- a/Studium MW/Nanobiotechnologie/DNA Computing.pptx
+++ b/Studium MW/Nanobiotechnologie/DNA Computing.pptx
@@ -208,7 +208,7 @@
           <a:p>
             <a:fld id="{8FE09A04-2735-4CC8-9F4D-E1F710D83CC7}" type="datetimeFigureOut">
               <a:rPr lang="de-DE" smtClean="0"/>
-              <a:t>21.06.2018</a:t>
+              <a:t>24.06.2018</a:t>
             </a:fld>
             <a:endParaRPr lang="de-DE"/>
           </a:p>
@@ -373,7 +373,7 @@
           <a:p>
             <a:fld id="{4249CEEF-3BC5-4B5B-9C81-C2CD995D98CD}" type="datetimeFigureOut">
               <a:rPr lang="de-DE" smtClean="0"/>
-              <a:t>21.06.2018</a:t>
+              <a:t>24.06.2018</a:t>
             </a:fld>
             <a:endParaRPr lang="de-DE"/>
           </a:p>
@@ -4093,7 +4093,7 @@
           <p:nvPr>
             <p:extLst>
               <p:ext uri="{D42A27DB-BD31-4B8C-83A1-F6EECF244321}">
-                <p14:modId xmlns:p14="http://schemas.microsoft.com/office/powerpoint/2010/main" val="2534390526"/>
+                <p14:modId xmlns:p14="http://schemas.microsoft.com/office/powerpoint/2010/main" val="1520584093"/>
               </p:ext>
             </p:extLst>
           </p:nvPr>
@@ -4217,38 +4217,6 @@
                       <a:pPr algn="ctr"/>
                       <a:r>
                         <a:rPr lang="de-DE" dirty="0" smtClean="0"/>
-                        <a:t>In vivo Applikationen</a:t>
-                      </a:r>
-                      <a:endParaRPr lang="de-DE" dirty="0"/>
-                    </a:p>
-                  </a:txBody>
-                  <a:tcPr anchor="ctr"/>
-                </a:tc>
-                <a:tc>
-                  <a:txBody>
-                    <a:bodyPr/>
-                    <a:lstStyle/>
-                    <a:p>
-                      <a:pPr algn="ctr"/>
-                      <a:r>
-                        <a:rPr lang="de-DE" dirty="0" smtClean="0"/>
-                        <a:t>Matrixabhängig</a:t>
-                      </a:r>
-                      <a:endParaRPr lang="de-DE" dirty="0"/>
-                    </a:p>
-                  </a:txBody>
-                  <a:tcPr anchor="ctr"/>
-                </a:tc>
-              </a:tr>
-              <a:tr h="525143">
-                <a:tc>
-                  <a:txBody>
-                    <a:bodyPr/>
-                    <a:lstStyle/>
-                    <a:p>
-                      <a:pPr algn="ctr"/>
-                      <a:r>
-                        <a:rPr lang="de-DE" dirty="0" smtClean="0"/>
                         <a:t>Winzige</a:t>
                       </a:r>
                       <a:r>
@@ -4333,6 +4301,38 @@
                       <a:r>
                         <a:rPr lang="de-DE" dirty="0" err="1" smtClean="0"/>
                         <a:t>Scalingprobleme</a:t>
+                      </a:r>
+                      <a:endParaRPr lang="de-DE" dirty="0" smtClean="0"/>
+                    </a:p>
+                  </a:txBody>
+                  <a:tcPr anchor="ctr"/>
+                </a:tc>
+              </a:tr>
+              <a:tr h="525143">
+                <a:tc>
+                  <a:txBody>
+                    <a:bodyPr/>
+                    <a:lstStyle/>
+                    <a:p>
+                      <a:pPr algn="ctr"/>
+                      <a:r>
+                        <a:rPr lang="de-DE" dirty="0" smtClean="0"/>
+                        <a:t>In vivo Applikationen</a:t>
+                      </a:r>
+                      <a:endParaRPr lang="de-DE" dirty="0"/>
+                    </a:p>
+                  </a:txBody>
+                  <a:tcPr anchor="ctr"/>
+                </a:tc>
+                <a:tc>
+                  <a:txBody>
+                    <a:bodyPr/>
+                    <a:lstStyle/>
+                    <a:p>
+                      <a:pPr algn="ctr"/>
+                      <a:r>
+                        <a:rPr lang="de-DE" dirty="0" smtClean="0"/>
+                        <a:t>Matrixabhängig</a:t>
                       </a:r>
                       <a:endParaRPr lang="de-DE" dirty="0"/>
                     </a:p>
@@ -5511,8 +5511,13 @@
           <a:p>
             <a:r>
               <a:rPr lang="de-DE" dirty="0" smtClean="0"/>
-              <a:t>Theoretisch Turing-komplett</a:t>
-            </a:r>
+              <a:t>Theoretisch </a:t>
+            </a:r>
+            <a:r>
+              <a:rPr lang="de-DE" dirty="0" smtClean="0"/>
+              <a:t>Turing-vollständig</a:t>
+            </a:r>
+            <a:endParaRPr lang="de-DE" dirty="0" smtClean="0"/>
           </a:p>
           <a:p>
             <a:r>

</xml_diff>